<commit_message>
diagramas pré-finais, codigo gerado automaticamante atraves de diagramas, adicao do package avaliacao, algumas correcoes ao codigo
</commit_message>
<xml_diff>
--- a/apresentacao.pptx
+++ b/apresentacao.pptx
@@ -8,12 +8,13 @@
     <p:sldId id="256" r:id="rId2"/>
     <p:sldId id="257" r:id="rId3"/>
     <p:sldId id="260" r:id="rId4"/>
-    <p:sldId id="259" r:id="rId5"/>
-    <p:sldId id="258" r:id="rId6"/>
-    <p:sldId id="261" r:id="rId7"/>
-    <p:sldId id="262" r:id="rId8"/>
-    <p:sldId id="263" r:id="rId9"/>
-    <p:sldId id="264" r:id="rId10"/>
+    <p:sldId id="265" r:id="rId5"/>
+    <p:sldId id="259" r:id="rId6"/>
+    <p:sldId id="258" r:id="rId7"/>
+    <p:sldId id="261" r:id="rId8"/>
+    <p:sldId id="262" r:id="rId9"/>
+    <p:sldId id="263" r:id="rId10"/>
+    <p:sldId id="264" r:id="rId11"/>
   </p:sldIdLst>
   <p:sldSz cx="12192000" cy="6858000"/>
   <p:notesSz cx="6858000" cy="9144000"/>
@@ -112,6 +113,11 @@
       </a:defRPr>
     </a:lvl9pPr>
   </p:defaultTextStyle>
+  <p:extLst>
+    <p:ext uri="{EFAFB233-063F-42B5-8137-9DF3F51BA10A}">
+      <p15:sldGuideLst xmlns:p15="http://schemas.microsoft.com/office/powerpoint/2012/main"/>
+    </p:ext>
+  </p:extLst>
 </p:presentation>
 </file>
 
@@ -3061,6 +3067,75 @@
 </p:sld>
 </file>
 
+<file path=ppt/slides/slide10.xml><?xml version="1.0" encoding="utf-8"?>
+<p:sld xmlns:a="http://schemas.openxmlformats.org/drawingml/2006/main" xmlns:r="http://schemas.openxmlformats.org/officeDocument/2006/relationships" xmlns:p="http://schemas.openxmlformats.org/presentationml/2006/main">
+  <p:cSld>
+    <p:spTree>
+      <p:nvGrpSpPr>
+        <p:cNvPr id="1" name=""/>
+        <p:cNvGrpSpPr/>
+        <p:nvPr/>
+      </p:nvGrpSpPr>
+      <p:grpSpPr>
+        <a:xfrm>
+          <a:off x="0" y="0"/>
+          <a:ext cx="0" cy="0"/>
+          <a:chOff x="0" y="0"/>
+          <a:chExt cx="0" cy="0"/>
+        </a:xfrm>
+      </p:grpSpPr>
+      <p:sp>
+        <p:nvSpPr>
+          <p:cNvPr id="4" name="CaixaDeTexto 3"/>
+          <p:cNvSpPr txBox="1"/>
+          <p:nvPr/>
+        </p:nvSpPr>
+        <p:spPr>
+          <a:xfrm>
+            <a:off x="4287328" y="1854679"/>
+            <a:ext cx="4278702" cy="2308324"/>
+          </a:xfrm>
+          <a:prstGeom prst="rect">
+            <a:avLst/>
+          </a:prstGeom>
+          <a:noFill/>
+        </p:spPr>
+        <p:txBody>
+          <a:bodyPr wrap="square" rtlCol="0">
+            <a:spAutoFit/>
+          </a:bodyPr>
+          <a:lstStyle/>
+          <a:p>
+            <a:r>
+              <a:rPr lang="pt-PT" sz="4800" dirty="0" smtClean="0"/>
+              <a:t>Perguntas?</a:t>
+            </a:r>
+          </a:p>
+          <a:p>
+            <a:endParaRPr lang="pt-PT" sz="4800" dirty="0"/>
+          </a:p>
+          <a:p>
+            <a:r>
+              <a:rPr lang="pt-PT" sz="4800" dirty="0" smtClean="0"/>
+              <a:t>Criticas?</a:t>
+            </a:r>
+            <a:endParaRPr lang="pt-PT" sz="4800" dirty="0"/>
+          </a:p>
+        </p:txBody>
+      </p:sp>
+    </p:spTree>
+    <p:extLst>
+      <p:ext uri="{BB962C8B-B14F-4D97-AF65-F5344CB8AC3E}">
+        <p14:creationId xmlns:p14="http://schemas.microsoft.com/office/powerpoint/2010/main" val="2802704250"/>
+      </p:ext>
+    </p:extLst>
+  </p:cSld>
+  <p:clrMapOvr>
+    <a:masterClrMapping/>
+  </p:clrMapOvr>
+</p:sld>
+</file>
+
 <file path=ppt/slides/slide2.xml><?xml version="1.0" encoding="utf-8"?>
 <p:sld xmlns:a="http://schemas.openxmlformats.org/drawingml/2006/main" xmlns:r="http://schemas.openxmlformats.org/officeDocument/2006/relationships" xmlns:p="http://schemas.openxmlformats.org/presentationml/2006/main">
   <p:cSld>
@@ -3284,6 +3359,66 @@
         </p:blipFill>
         <p:spPr>
           <a:xfrm>
+            <a:off x="2495550" y="0"/>
+            <a:ext cx="7200900" cy="6858000"/>
+          </a:xfrm>
+          <a:prstGeom prst="rect">
+            <a:avLst/>
+          </a:prstGeom>
+        </p:spPr>
+      </p:pic>
+    </p:spTree>
+    <p:extLst>
+      <p:ext uri="{BB962C8B-B14F-4D97-AF65-F5344CB8AC3E}">
+        <p14:creationId xmlns:p14="http://schemas.microsoft.com/office/powerpoint/2010/main" val="752039484"/>
+      </p:ext>
+    </p:extLst>
+  </p:cSld>
+  <p:clrMapOvr>
+    <a:masterClrMapping/>
+  </p:clrMapOvr>
+</p:sld>
+</file>
+
+<file path=ppt/slides/slide5.xml><?xml version="1.0" encoding="utf-8"?>
+<p:sld xmlns:a="http://schemas.openxmlformats.org/drawingml/2006/main" xmlns:r="http://schemas.openxmlformats.org/officeDocument/2006/relationships" xmlns:p="http://schemas.openxmlformats.org/presentationml/2006/main">
+  <p:cSld>
+    <p:spTree>
+      <p:nvGrpSpPr>
+        <p:cNvPr id="1" name=""/>
+        <p:cNvGrpSpPr/>
+        <p:nvPr/>
+      </p:nvGrpSpPr>
+      <p:grpSpPr>
+        <a:xfrm>
+          <a:off x="0" y="0"/>
+          <a:ext cx="0" cy="0"/>
+          <a:chOff x="0" y="0"/>
+          <a:chExt cx="0" cy="0"/>
+        </a:xfrm>
+      </p:grpSpPr>
+      <p:pic>
+        <p:nvPicPr>
+          <p:cNvPr id="4" name="Imagem 3"/>
+          <p:cNvPicPr>
+            <a:picLocks noChangeAspect="1"/>
+          </p:cNvPicPr>
+          <p:nvPr/>
+        </p:nvPicPr>
+        <p:blipFill>
+          <a:blip r:embed="rId2">
+            <a:extLst>
+              <a:ext uri="{28A0092B-C50C-407E-A947-70E740481C1C}">
+                <a14:useLocalDpi xmlns:a14="http://schemas.microsoft.com/office/drawing/2010/main" val="0"/>
+              </a:ext>
+            </a:extLst>
+          </a:blip>
+          <a:stretch>
+            <a:fillRect/>
+          </a:stretch>
+        </p:blipFill>
+        <p:spPr>
+          <a:xfrm>
             <a:off x="2652082" y="745016"/>
             <a:ext cx="6655819" cy="5343672"/>
           </a:xfrm>
@@ -3349,7 +3484,7 @@
 </p:sld>
 </file>
 
-<file path=ppt/slides/slide5.xml><?xml version="1.0" encoding="utf-8"?>
+<file path=ppt/slides/slide6.xml><?xml version="1.0" encoding="utf-8"?>
 <p:sld xmlns:a="http://schemas.openxmlformats.org/drawingml/2006/main" xmlns:r="http://schemas.openxmlformats.org/officeDocument/2006/relationships" xmlns:p="http://schemas.openxmlformats.org/presentationml/2006/main">
   <p:cSld>
     <p:spTree>
@@ -3498,7 +3633,7 @@
 </p:sld>
 </file>
 
-<file path=ppt/slides/slide6.xml><?xml version="1.0" encoding="utf-8"?>
+<file path=ppt/slides/slide7.xml><?xml version="1.0" encoding="utf-8"?>
 <p:sld xmlns:a="http://schemas.openxmlformats.org/drawingml/2006/main" xmlns:r="http://schemas.openxmlformats.org/officeDocument/2006/relationships" xmlns:p="http://schemas.openxmlformats.org/presentationml/2006/main">
   <p:cSld>
     <p:spTree>
@@ -3588,100 +3723,6 @@
 </p:sld>
 </file>
 
-<file path=ppt/slides/slide7.xml><?xml version="1.0" encoding="utf-8"?>
-<p:sld xmlns:a="http://schemas.openxmlformats.org/drawingml/2006/main" xmlns:r="http://schemas.openxmlformats.org/officeDocument/2006/relationships" xmlns:p="http://schemas.openxmlformats.org/presentationml/2006/main">
-  <p:cSld>
-    <p:spTree>
-      <p:nvGrpSpPr>
-        <p:cNvPr id="1" name=""/>
-        <p:cNvGrpSpPr/>
-        <p:nvPr/>
-      </p:nvGrpSpPr>
-      <p:grpSpPr>
-        <a:xfrm>
-          <a:off x="0" y="0"/>
-          <a:ext cx="0" cy="0"/>
-          <a:chOff x="0" y="0"/>
-          <a:chExt cx="0" cy="0"/>
-        </a:xfrm>
-      </p:grpSpPr>
-      <p:sp>
-        <p:nvSpPr>
-          <p:cNvPr id="2" name="Título 1"/>
-          <p:cNvSpPr>
-            <a:spLocks noGrp="1"/>
-          </p:cNvSpPr>
-          <p:nvPr>
-            <p:ph type="title"/>
-          </p:nvPr>
-        </p:nvSpPr>
-        <p:spPr/>
-        <p:txBody>
-          <a:bodyPr/>
-          <a:lstStyle/>
-          <a:p>
-            <a:r>
-              <a:rPr lang="pt-PT" dirty="0" smtClean="0"/>
-              <a:t>Documentação</a:t>
-            </a:r>
-            <a:endParaRPr lang="pt-PT" dirty="0"/>
-          </a:p>
-        </p:txBody>
-      </p:sp>
-      <p:sp>
-        <p:nvSpPr>
-          <p:cNvPr id="3" name="Marcador de Posição de Conteúdo 2"/>
-          <p:cNvSpPr>
-            <a:spLocks noGrp="1"/>
-          </p:cNvSpPr>
-          <p:nvPr>
-            <p:ph idx="1"/>
-          </p:nvPr>
-        </p:nvSpPr>
-        <p:spPr/>
-        <p:txBody>
-          <a:bodyPr/>
-          <a:lstStyle/>
-          <a:p>
-            <a:r>
-              <a:rPr lang="pt-PT" dirty="0" smtClean="0"/>
-              <a:t>Qualquer fase do desenvolvimento de qualquer software requer documentação.</a:t>
-            </a:r>
-          </a:p>
-          <a:p>
-            <a:endParaRPr lang="pt-PT" dirty="0"/>
-          </a:p>
-          <a:p>
-            <a:r>
-              <a:rPr lang="pt-PT" dirty="0" smtClean="0"/>
-              <a:t>Quando o software é parcialmente desenvolvido por um indivíduo ou grupo a documentação torna-se muito mais necessária.</a:t>
-            </a:r>
-          </a:p>
-          <a:p>
-            <a:endParaRPr lang="pt-PT" dirty="0"/>
-          </a:p>
-          <a:p>
-            <a:r>
-              <a:rPr lang="pt-PT" dirty="0" smtClean="0"/>
-              <a:t>Controlo de versões de documentação e código-fonte.</a:t>
-            </a:r>
-            <a:endParaRPr lang="pt-PT" dirty="0"/>
-          </a:p>
-        </p:txBody>
-      </p:sp>
-    </p:spTree>
-    <p:extLst>
-      <p:ext uri="{BB962C8B-B14F-4D97-AF65-F5344CB8AC3E}">
-        <p14:creationId xmlns:p14="http://schemas.microsoft.com/office/powerpoint/2010/main" val="2252781382"/>
-      </p:ext>
-    </p:extLst>
-  </p:cSld>
-  <p:clrMapOvr>
-    <a:masterClrMapping/>
-  </p:clrMapOvr>
-</p:sld>
-</file>
-
 <file path=ppt/slides/slide8.xml><?xml version="1.0" encoding="utf-8"?>
 <p:sld xmlns:a="http://schemas.openxmlformats.org/drawingml/2006/main" xmlns:r="http://schemas.openxmlformats.org/officeDocument/2006/relationships" xmlns:p="http://schemas.openxmlformats.org/presentationml/2006/main">
   <p:cSld>
@@ -3716,7 +3757,7 @@
           <a:p>
             <a:r>
               <a:rPr lang="pt-PT" dirty="0" smtClean="0"/>
-              <a:t>Repositório de Documentação</a:t>
+              <a:t>Documentação</a:t>
             </a:r>
             <a:endParaRPr lang="pt-PT" dirty="0"/>
           </a:p>
@@ -3724,38 +3765,49 @@
       </p:sp>
       <p:sp>
         <p:nvSpPr>
-          <p:cNvPr id="4" name="CaixaDeTexto 3"/>
-          <p:cNvSpPr txBox="1"/>
-          <p:nvPr/>
-        </p:nvSpPr>
-        <p:spPr>
-          <a:xfrm>
-            <a:off x="955650" y="3053751"/>
-            <a:ext cx="10280699" cy="707886"/>
-          </a:xfrm>
-          <a:prstGeom prst="rect">
-            <a:avLst/>
-          </a:prstGeom>
-          <a:noFill/>
-        </p:spPr>
-        <p:txBody>
-          <a:bodyPr wrap="none" rtlCol="0">
-            <a:spAutoFit/>
-          </a:bodyPr>
-          <a:lstStyle/>
-          <a:p>
-            <a:r>
-              <a:rPr lang="pt-PT" sz="4000" dirty="0" smtClean="0"/>
-              <a:t>https://github.com/JakkoPhD/enunciadoPOO.git</a:t>
-            </a:r>
-            <a:endParaRPr lang="pt-PT" sz="4000" dirty="0"/>
+          <p:cNvPr id="3" name="Marcador de Posição de Conteúdo 2"/>
+          <p:cNvSpPr>
+            <a:spLocks noGrp="1"/>
+          </p:cNvSpPr>
+          <p:nvPr>
+            <p:ph idx="1"/>
+          </p:nvPr>
+        </p:nvSpPr>
+        <p:spPr/>
+        <p:txBody>
+          <a:bodyPr/>
+          <a:lstStyle/>
+          <a:p>
+            <a:r>
+              <a:rPr lang="pt-PT" dirty="0" smtClean="0"/>
+              <a:t>Qualquer fase do desenvolvimento de qualquer software requer documentação.</a:t>
+            </a:r>
+          </a:p>
+          <a:p>
+            <a:endParaRPr lang="pt-PT" dirty="0"/>
+          </a:p>
+          <a:p>
+            <a:r>
+              <a:rPr lang="pt-PT" dirty="0" smtClean="0"/>
+              <a:t>Quando o software é parcialmente desenvolvido por um indivíduo ou grupo a documentação torna-se muito mais necessária.</a:t>
+            </a:r>
+          </a:p>
+          <a:p>
+            <a:endParaRPr lang="pt-PT" dirty="0"/>
+          </a:p>
+          <a:p>
+            <a:r>
+              <a:rPr lang="pt-PT" dirty="0" smtClean="0"/>
+              <a:t>Controlo de versões de documentação e código-fonte.</a:t>
+            </a:r>
+            <a:endParaRPr lang="pt-PT" dirty="0"/>
           </a:p>
         </p:txBody>
       </p:sp>
     </p:spTree>
     <p:extLst>
       <p:ext uri="{BB962C8B-B14F-4D97-AF65-F5344CB8AC3E}">
-        <p14:creationId xmlns:p14="http://schemas.microsoft.com/office/powerpoint/2010/main" val="3900430430"/>
+        <p14:creationId xmlns:p14="http://schemas.microsoft.com/office/powerpoint/2010/main" val="2252781382"/>
       </p:ext>
     </p:extLst>
   </p:cSld>
@@ -3784,14 +3836,37 @@
       </p:grpSpPr>
       <p:sp>
         <p:nvSpPr>
+          <p:cNvPr id="2" name="Título 1"/>
+          <p:cNvSpPr>
+            <a:spLocks noGrp="1"/>
+          </p:cNvSpPr>
+          <p:nvPr>
+            <p:ph type="title"/>
+          </p:nvPr>
+        </p:nvSpPr>
+        <p:spPr/>
+        <p:txBody>
+          <a:bodyPr/>
+          <a:lstStyle/>
+          <a:p>
+            <a:r>
+              <a:rPr lang="pt-PT" dirty="0" smtClean="0"/>
+              <a:t>Repositório de Documentação</a:t>
+            </a:r>
+            <a:endParaRPr lang="pt-PT" dirty="0"/>
+          </a:p>
+        </p:txBody>
+      </p:sp>
+      <p:sp>
+        <p:nvSpPr>
           <p:cNvPr id="4" name="CaixaDeTexto 3"/>
           <p:cNvSpPr txBox="1"/>
           <p:nvPr/>
         </p:nvSpPr>
         <p:spPr>
           <a:xfrm>
-            <a:off x="4287328" y="1854679"/>
-            <a:ext cx="4278702" cy="2308324"/>
+            <a:off x="955650" y="3053751"/>
+            <a:ext cx="10280699" cy="707886"/>
           </a:xfrm>
           <a:prstGeom prst="rect">
             <a:avLst/>
@@ -3799,32 +3874,23 @@
           <a:noFill/>
         </p:spPr>
         <p:txBody>
-          <a:bodyPr wrap="square" rtlCol="0">
+          <a:bodyPr wrap="none" rtlCol="0">
             <a:spAutoFit/>
           </a:bodyPr>
           <a:lstStyle/>
           <a:p>
             <a:r>
-              <a:rPr lang="pt-PT" sz="4800" dirty="0" smtClean="0"/>
-              <a:t>Perguntas?</a:t>
-            </a:r>
-          </a:p>
-          <a:p>
-            <a:endParaRPr lang="pt-PT" sz="4800" dirty="0"/>
-          </a:p>
-          <a:p>
-            <a:r>
-              <a:rPr lang="pt-PT" sz="4800" dirty="0" smtClean="0"/>
-              <a:t>Criticas?</a:t>
-            </a:r>
-            <a:endParaRPr lang="pt-PT" sz="4800" dirty="0"/>
+              <a:rPr lang="pt-PT" sz="4000" dirty="0" smtClean="0"/>
+              <a:t>https://github.com/JakkoPhD/enunciadoPOO.git</a:t>
+            </a:r>
+            <a:endParaRPr lang="pt-PT" sz="4000" dirty="0"/>
           </a:p>
         </p:txBody>
       </p:sp>
     </p:spTree>
     <p:extLst>
       <p:ext uri="{BB962C8B-B14F-4D97-AF65-F5344CB8AC3E}">
-        <p14:creationId xmlns:p14="http://schemas.microsoft.com/office/powerpoint/2010/main" val="2802704250"/>
+        <p14:creationId xmlns:p14="http://schemas.microsoft.com/office/powerpoint/2010/main" val="3900430430"/>
       </p:ext>
     </p:extLst>
   </p:cSld>

</xml_diff>